<commit_message>
add second one hyper casual
</commit_message>
<xml_diff>
--- a/PG09_SaiKoushyun.pptx
+++ b/PG09_SaiKoushyun.pptx
@@ -260,7 +260,7 @@
           <a:p>
             <a:fld id="{C2037C05-DB8E-4D11-AA11-CE8995E7CCB2}" type="datetimeFigureOut">
               <a:rPr kumimoji="1" lang="ja-JP" altLang="en-US" smtClean="0"/>
-              <a:t>2023/7/3</a:t>
+              <a:t>2023/7/10</a:t>
             </a:fld>
             <a:endParaRPr kumimoji="1" lang="ja-JP" altLang="en-US"/>
           </a:p>
@@ -490,7 +490,7 @@
           <a:p>
             <a:fld id="{C2037C05-DB8E-4D11-AA11-CE8995E7CCB2}" type="datetimeFigureOut">
               <a:rPr kumimoji="1" lang="ja-JP" altLang="en-US" smtClean="0"/>
-              <a:t>2023/7/3</a:t>
+              <a:t>2023/7/10</a:t>
             </a:fld>
             <a:endParaRPr kumimoji="1" lang="ja-JP" altLang="en-US"/>
           </a:p>
@@ -730,7 +730,7 @@
           <a:p>
             <a:fld id="{C2037C05-DB8E-4D11-AA11-CE8995E7CCB2}" type="datetimeFigureOut">
               <a:rPr kumimoji="1" lang="ja-JP" altLang="en-US" smtClean="0"/>
-              <a:t>2023/7/3</a:t>
+              <a:t>2023/7/10</a:t>
             </a:fld>
             <a:endParaRPr kumimoji="1" lang="ja-JP" altLang="en-US"/>
           </a:p>
@@ -960,7 +960,7 @@
           <a:p>
             <a:fld id="{C2037C05-DB8E-4D11-AA11-CE8995E7CCB2}" type="datetimeFigureOut">
               <a:rPr kumimoji="1" lang="ja-JP" altLang="en-US" smtClean="0"/>
-              <a:t>2023/7/3</a:t>
+              <a:t>2023/7/10</a:t>
             </a:fld>
             <a:endParaRPr kumimoji="1" lang="ja-JP" altLang="en-US"/>
           </a:p>
@@ -1235,7 +1235,7 @@
           <a:p>
             <a:fld id="{C2037C05-DB8E-4D11-AA11-CE8995E7CCB2}" type="datetimeFigureOut">
               <a:rPr kumimoji="1" lang="ja-JP" altLang="en-US" smtClean="0"/>
-              <a:t>2023/7/3</a:t>
+              <a:t>2023/7/10</a:t>
             </a:fld>
             <a:endParaRPr kumimoji="1" lang="ja-JP" altLang="en-US"/>
           </a:p>
@@ -1564,7 +1564,7 @@
           <a:p>
             <a:fld id="{C2037C05-DB8E-4D11-AA11-CE8995E7CCB2}" type="datetimeFigureOut">
               <a:rPr kumimoji="1" lang="ja-JP" altLang="en-US" smtClean="0"/>
-              <a:t>2023/7/3</a:t>
+              <a:t>2023/7/10</a:t>
             </a:fld>
             <a:endParaRPr kumimoji="1" lang="ja-JP" altLang="en-US"/>
           </a:p>
@@ -2040,7 +2040,7 @@
           <a:p>
             <a:fld id="{C2037C05-DB8E-4D11-AA11-CE8995E7CCB2}" type="datetimeFigureOut">
               <a:rPr kumimoji="1" lang="ja-JP" altLang="en-US" smtClean="0"/>
-              <a:t>2023/7/3</a:t>
+              <a:t>2023/7/10</a:t>
             </a:fld>
             <a:endParaRPr kumimoji="1" lang="ja-JP" altLang="en-US"/>
           </a:p>
@@ -2181,7 +2181,7 @@
           <a:p>
             <a:fld id="{C2037C05-DB8E-4D11-AA11-CE8995E7CCB2}" type="datetimeFigureOut">
               <a:rPr kumimoji="1" lang="ja-JP" altLang="en-US" smtClean="0"/>
-              <a:t>2023/7/3</a:t>
+              <a:t>2023/7/10</a:t>
             </a:fld>
             <a:endParaRPr kumimoji="1" lang="ja-JP" altLang="en-US"/>
           </a:p>
@@ -2294,7 +2294,7 @@
           <a:p>
             <a:fld id="{C2037C05-DB8E-4D11-AA11-CE8995E7CCB2}" type="datetimeFigureOut">
               <a:rPr kumimoji="1" lang="ja-JP" altLang="en-US" smtClean="0"/>
-              <a:t>2023/7/3</a:t>
+              <a:t>2023/7/10</a:t>
             </a:fld>
             <a:endParaRPr kumimoji="1" lang="ja-JP" altLang="en-US"/>
           </a:p>
@@ -2637,7 +2637,7 @@
           <a:p>
             <a:fld id="{C2037C05-DB8E-4D11-AA11-CE8995E7CCB2}" type="datetimeFigureOut">
               <a:rPr kumimoji="1" lang="ja-JP" altLang="en-US" smtClean="0"/>
-              <a:t>2023/7/3</a:t>
+              <a:t>2023/7/10</a:t>
             </a:fld>
             <a:endParaRPr kumimoji="1" lang="ja-JP" altLang="en-US"/>
           </a:p>
@@ -2925,7 +2925,7 @@
           <a:p>
             <a:fld id="{C2037C05-DB8E-4D11-AA11-CE8995E7CCB2}" type="datetimeFigureOut">
               <a:rPr kumimoji="1" lang="ja-JP" altLang="en-US" smtClean="0"/>
-              <a:t>2023/7/3</a:t>
+              <a:t>2023/7/10</a:t>
             </a:fld>
             <a:endParaRPr kumimoji="1" lang="ja-JP" altLang="en-US"/>
           </a:p>
@@ -3198,7 +3198,7 @@
           <a:p>
             <a:fld id="{C2037C05-DB8E-4D11-AA11-CE8995E7CCB2}" type="datetimeFigureOut">
               <a:rPr kumimoji="1" lang="ja-JP" altLang="en-US" smtClean="0"/>
-              <a:t>2023/7/3</a:t>
+              <a:t>2023/7/10</a:t>
             </a:fld>
             <a:endParaRPr kumimoji="1" lang="ja-JP" altLang="en-US"/>
           </a:p>
@@ -4665,7 +4665,7 @@
                 <a:latin typeface="Meiryo UI" panose="020B0604030504040204" pitchFamily="50" charset="-128"/>
                 <a:ea typeface="Meiryo UI" panose="020B0604030504040204" pitchFamily="50" charset="-128"/>
               </a:rPr>
-              <a:t>SUSHI STACKER</a:t>
+              <a:t>SUSHI HOLDER</a:t>
             </a:r>
             <a:endParaRPr kumimoji="1" lang="ja-JP" altLang="en-US" sz="2400" dirty="0">
               <a:latin typeface="Meiryo UI" panose="020B0604030504040204" pitchFamily="50" charset="-128"/>
@@ -4738,7 +4738,7 @@
         <p:spPr>
           <a:xfrm>
             <a:off x="134224" y="721453"/>
-            <a:ext cx="7550092" cy="5262979"/>
+            <a:ext cx="7550092" cy="5755422"/>
           </a:xfrm>
           <a:prstGeom prst="rect">
             <a:avLst/>
@@ -4848,7 +4848,7 @@
                 <a:latin typeface="Meiryo UI" panose="020B0604030504040204" pitchFamily="50" charset="-128"/>
                 <a:ea typeface="Meiryo UI" panose="020B0604030504040204" pitchFamily="50" charset="-128"/>
               </a:rPr>
-              <a:t>画面の縁側から飛んできた寿司を箸でキャッチして同じ種類の寿司を揃える</a:t>
+              <a:t>画面の縁側から飛んできた寿司を箸でキャッチして「同じ種類」の寿司を揃える</a:t>
             </a:r>
             <a:endParaRPr lang="en-US" altLang="ja-JP" sz="1600" dirty="0">
               <a:latin typeface="Meiryo UI" panose="020B0604030504040204" pitchFamily="50" charset="-128"/>
@@ -5017,7 +5017,38 @@
                 <a:latin typeface="Meiryo UI" panose="020B0604030504040204" pitchFamily="50" charset="-128"/>
                 <a:ea typeface="Meiryo UI" panose="020B0604030504040204" pitchFamily="50" charset="-128"/>
               </a:rPr>
-              <a:t>揃える途中で他の種類の寿司をキャッチしてしまうと箸の上の寿司は全部消える</a:t>
+              <a:t>「同じ種類」の寿司は</a:t>
+            </a:r>
+            <a:r>
+              <a:rPr lang="en-US" altLang="ja-JP" sz="1600" dirty="0">
+                <a:latin typeface="Meiryo UI" panose="020B0604030504040204" pitchFamily="50" charset="-128"/>
+                <a:ea typeface="Meiryo UI" panose="020B0604030504040204" pitchFamily="50" charset="-128"/>
+              </a:rPr>
+              <a:t>3</a:t>
+            </a:r>
+            <a:r>
+              <a:rPr lang="ja-JP" altLang="en-US" sz="1600" dirty="0">
+                <a:latin typeface="Meiryo UI" panose="020B0604030504040204" pitchFamily="50" charset="-128"/>
+                <a:ea typeface="Meiryo UI" panose="020B0604030504040204" pitchFamily="50" charset="-128"/>
+              </a:rPr>
+              <a:t>個以上揃ったら点数をもらえる</a:t>
+            </a:r>
+            <a:endParaRPr lang="en-US" altLang="ja-JP" sz="1600" dirty="0">
+              <a:latin typeface="Meiryo UI" panose="020B0604030504040204" pitchFamily="50" charset="-128"/>
+              <a:ea typeface="Meiryo UI" panose="020B0604030504040204" pitchFamily="50" charset="-128"/>
+            </a:endParaRPr>
+          </a:p>
+          <a:p>
+            <a:pPr marL="285750" indent="-285750">
+              <a:buFont typeface="Arial" panose="020B0604020202020204" pitchFamily="34" charset="0"/>
+              <a:buChar char="•"/>
+            </a:pPr>
+            <a:r>
+              <a:rPr lang="ja-JP" altLang="en-US" sz="1600" dirty="0">
+                <a:latin typeface="Meiryo UI" panose="020B0604030504040204" pitchFamily="50" charset="-128"/>
+                <a:ea typeface="Meiryo UI" panose="020B0604030504040204" pitchFamily="50" charset="-128"/>
+              </a:rPr>
+              <a:t>揃える途中で「違った種類」の寿司をキャッチしてしまうと箸の上の寿司は全部消える</a:t>
             </a:r>
             <a:endParaRPr lang="en-US" altLang="ja-JP" sz="1600" dirty="0">
               <a:latin typeface="Meiryo UI" panose="020B0604030504040204" pitchFamily="50" charset="-128"/>
@@ -5074,8 +5105,18 @@
                 <a:latin typeface="Meiryo UI" panose="020B0604030504040204" pitchFamily="50" charset="-128"/>
                 <a:ea typeface="Meiryo UI" panose="020B0604030504040204" pitchFamily="50" charset="-128"/>
               </a:rPr>
-              <a:t>けっきょく南極大冒険のような感じ</a:t>
-            </a:r>
+              <a:t>フルーツ忍者のような感じ</a:t>
+            </a:r>
+            <a:endParaRPr lang="en-US" altLang="ja-JP" sz="1600" dirty="0">
+              <a:latin typeface="Meiryo UI" panose="020B0604030504040204" pitchFamily="50" charset="-128"/>
+              <a:ea typeface="Meiryo UI" panose="020B0604030504040204" pitchFamily="50" charset="-128"/>
+            </a:endParaRPr>
+          </a:p>
+          <a:p>
+            <a:pPr marL="285750" indent="-285750">
+              <a:buFont typeface="Arial" panose="020B0604020202020204" pitchFamily="34" charset="0"/>
+              <a:buChar char="•"/>
+            </a:pPr>
             <a:endParaRPr kumimoji="1" lang="ja-JP" altLang="en-US" sz="1600" dirty="0">
               <a:latin typeface="Meiryo UI" panose="020B0604030504040204" pitchFamily="50" charset="-128"/>
               <a:ea typeface="Meiryo UI" panose="020B0604030504040204" pitchFamily="50" charset="-128"/>
@@ -5381,12 +5422,147 @@
           </a:p>
         </p:txBody>
       </p:sp>
+      <p:sp>
+        <p:nvSpPr>
+          <p:cNvPr id="12" name="AutoShape 2" descr="Fruit Ninja® - Google Play のアプリ">
+            <a:extLst>
+              <a:ext uri="{FF2B5EF4-FFF2-40B4-BE49-F238E27FC236}">
+                <a16:creationId xmlns:a16="http://schemas.microsoft.com/office/drawing/2014/main" id="{B5CB5BA1-6EEB-31E3-CF30-DB971E097E32}"/>
+              </a:ext>
+            </a:extLst>
+          </p:cNvPr>
+          <p:cNvSpPr>
+            <a:spLocks noChangeAspect="1" noChangeArrowheads="1"/>
+          </p:cNvSpPr>
+          <p:nvPr/>
+        </p:nvSpPr>
+        <p:spPr bwMode="auto">
+          <a:xfrm>
+            <a:off x="5943600" y="3276600"/>
+            <a:ext cx="304800" cy="304800"/>
+          </a:xfrm>
+          <a:prstGeom prst="rect">
+            <a:avLst/>
+          </a:prstGeom>
+          <a:noFill/>
+          <a:extLst>
+            <a:ext uri="{909E8E84-426E-40DD-AFC4-6F175D3DCCD1}">
+              <a14:hiddenFill xmlns:a14="http://schemas.microsoft.com/office/drawing/2010/main">
+                <a:solidFill>
+                  <a:srgbClr val="FFFFFF"/>
+                </a:solidFill>
+              </a14:hiddenFill>
+            </a:ext>
+          </a:extLst>
+        </p:spPr>
+        <p:txBody>
+          <a:bodyPr vert="horz" wrap="square" lIns="91440" tIns="45720" rIns="91440" bIns="45720" numCol="1" anchor="t" anchorCtr="0" compatLnSpc="1">
+            <a:prstTxWarp prst="textNoShape">
+              <a:avLst/>
+            </a:prstTxWarp>
+          </a:bodyPr>
+          <a:lstStyle/>
+          <a:p>
+            <a:endParaRPr lang="zh-TW" altLang="en-US"/>
+          </a:p>
+        </p:txBody>
+      </p:sp>
+      <p:sp>
+        <p:nvSpPr>
+          <p:cNvPr id="13" name="AutoShape 4" descr="Fruit Ninja® - Google Play のアプリ">
+            <a:extLst>
+              <a:ext uri="{FF2B5EF4-FFF2-40B4-BE49-F238E27FC236}">
+                <a16:creationId xmlns:a16="http://schemas.microsoft.com/office/drawing/2014/main" id="{32FC2D9E-B231-38BB-4DEE-FAA3C8C419C4}"/>
+              </a:ext>
+            </a:extLst>
+          </p:cNvPr>
+          <p:cNvSpPr>
+            <a:spLocks noChangeAspect="1" noChangeArrowheads="1"/>
+          </p:cNvSpPr>
+          <p:nvPr/>
+        </p:nvSpPr>
+        <p:spPr bwMode="auto">
+          <a:xfrm>
+            <a:off x="6096000" y="3429000"/>
+            <a:ext cx="304800" cy="304800"/>
+          </a:xfrm>
+          <a:prstGeom prst="rect">
+            <a:avLst/>
+          </a:prstGeom>
+          <a:noFill/>
+          <a:extLst>
+            <a:ext uri="{909E8E84-426E-40DD-AFC4-6F175D3DCCD1}">
+              <a14:hiddenFill xmlns:a14="http://schemas.microsoft.com/office/drawing/2010/main">
+                <a:solidFill>
+                  <a:srgbClr val="FFFFFF"/>
+                </a:solidFill>
+              </a14:hiddenFill>
+            </a:ext>
+          </a:extLst>
+        </p:spPr>
+        <p:txBody>
+          <a:bodyPr vert="horz" wrap="square" lIns="91440" tIns="45720" rIns="91440" bIns="45720" numCol="1" anchor="t" anchorCtr="0" compatLnSpc="1">
+            <a:prstTxWarp prst="textNoShape">
+              <a:avLst/>
+            </a:prstTxWarp>
+          </a:bodyPr>
+          <a:lstStyle/>
+          <a:p>
+            <a:endParaRPr lang="zh-TW" altLang="en-US"/>
+          </a:p>
+        </p:txBody>
+      </p:sp>
+      <p:sp>
+        <p:nvSpPr>
+          <p:cNvPr id="16" name="AutoShape 8" descr="Fruit Ninja® - Google Play のアプリ">
+            <a:extLst>
+              <a:ext uri="{FF2B5EF4-FFF2-40B4-BE49-F238E27FC236}">
+                <a16:creationId xmlns:a16="http://schemas.microsoft.com/office/drawing/2014/main" id="{6E1D1EB2-C6B3-8629-1597-86B53FAC5B9E}"/>
+              </a:ext>
+            </a:extLst>
+          </p:cNvPr>
+          <p:cNvSpPr>
+            <a:spLocks noChangeAspect="1" noChangeArrowheads="1"/>
+          </p:cNvSpPr>
+          <p:nvPr/>
+        </p:nvSpPr>
+        <p:spPr bwMode="auto">
+          <a:xfrm>
+            <a:off x="3976476" y="2877553"/>
+            <a:ext cx="4676274" cy="4676274"/>
+          </a:xfrm>
+          <a:prstGeom prst="rect">
+            <a:avLst/>
+          </a:prstGeom>
+          <a:noFill/>
+          <a:extLst>
+            <a:ext uri="{909E8E84-426E-40DD-AFC4-6F175D3DCCD1}">
+              <a14:hiddenFill xmlns:a14="http://schemas.microsoft.com/office/drawing/2010/main">
+                <a:solidFill>
+                  <a:srgbClr val="FFFFFF"/>
+                </a:solidFill>
+              </a14:hiddenFill>
+            </a:ext>
+          </a:extLst>
+        </p:spPr>
+        <p:txBody>
+          <a:bodyPr vert="horz" wrap="square" lIns="91440" tIns="45720" rIns="91440" bIns="45720" numCol="1" anchor="t" anchorCtr="0" compatLnSpc="1">
+            <a:prstTxWarp prst="textNoShape">
+              <a:avLst/>
+            </a:prstTxWarp>
+          </a:bodyPr>
+          <a:lstStyle/>
+          <a:p>
+            <a:endParaRPr lang="zh-TW" altLang="en-US"/>
+          </a:p>
+        </p:txBody>
+      </p:sp>
       <p:pic>
         <p:nvPicPr>
-          <p:cNvPr id="2" name="図 1">
-            <a:extLst>
-              <a:ext uri="{FF2B5EF4-FFF2-40B4-BE49-F238E27FC236}">
-                <a16:creationId xmlns:a16="http://schemas.microsoft.com/office/drawing/2014/main" id="{68F1EB65-9089-4A57-BFC5-712279DD2E80}"/>
+          <p:cNvPr id="20" name="圖片 19">
+            <a:extLst>
+              <a:ext uri="{FF2B5EF4-FFF2-40B4-BE49-F238E27FC236}">
+                <a16:creationId xmlns:a16="http://schemas.microsoft.com/office/drawing/2014/main" id="{3A6E7C29-657E-DDCD-FC82-FD0014A09298}"/>
               </a:ext>
             </a:extLst>
           </p:cNvPr>
@@ -5403,8 +5579,8 @@
         </p:blipFill>
         <p:spPr>
           <a:xfrm>
-            <a:off x="8475148" y="568197"/>
-            <a:ext cx="2810690" cy="2459354"/>
+            <a:off x="8021190" y="3815131"/>
+            <a:ext cx="3833936" cy="2169301"/>
           </a:xfrm>
           <a:prstGeom prst="rect">
             <a:avLst/>
@@ -5413,70 +5589,57 @@
       </p:pic>
       <p:pic>
         <p:nvPicPr>
-          <p:cNvPr id="11" name="図 10">
-            <a:extLst>
-              <a:ext uri="{FF2B5EF4-FFF2-40B4-BE49-F238E27FC236}">
-                <a16:creationId xmlns:a16="http://schemas.microsoft.com/office/drawing/2014/main" id="{054B91E5-5D72-469D-B85D-EC731574A5EC}"/>
+          <p:cNvPr id="1034" name="Picture 10" descr="フルーツニンジャのレビューと序盤攻略 - アプリゲット">
+            <a:extLst>
+              <a:ext uri="{FF2B5EF4-FFF2-40B4-BE49-F238E27FC236}">
+                <a16:creationId xmlns:a16="http://schemas.microsoft.com/office/drawing/2014/main" id="{51E1C817-C0AC-D05C-04D0-C2E4786A8728}"/>
               </a:ext>
             </a:extLst>
           </p:cNvPr>
           <p:cNvPicPr>
-            <a:picLocks noChangeAspect="1"/>
+            <a:picLocks noChangeAspect="1" noChangeArrowheads="1"/>
           </p:cNvPicPr>
           <p:nvPr/>
         </p:nvPicPr>
         <p:blipFill>
-          <a:blip r:embed="rId2"/>
+          <a:blip r:embed="rId3">
+            <a:extLst>
+              <a:ext uri="{28A0092B-C50C-407E-A947-70E740481C1C}">
+                <a14:useLocalDpi xmlns:a14="http://schemas.microsoft.com/office/drawing/2010/main" val="0"/>
+              </a:ext>
+            </a:extLst>
+          </a:blip>
+          <a:srcRect/>
           <a:stretch>
             <a:fillRect/>
           </a:stretch>
         </p:blipFill>
-        <p:spPr>
+        <p:spPr bwMode="auto">
           <a:xfrm>
-            <a:off x="8475147" y="3822919"/>
-            <a:ext cx="2819295" cy="2466884"/>
+            <a:off x="8059820" y="923330"/>
+            <a:ext cx="3833936" cy="2246447"/>
           </a:xfrm>
           <a:prstGeom prst="rect">
             <a:avLst/>
           </a:prstGeom>
+          <a:noFill/>
+          <a:extLst>
+            <a:ext uri="{909E8E84-426E-40DD-AFC4-6F175D3DCCD1}">
+              <a14:hiddenFill xmlns:a14="http://schemas.microsoft.com/office/drawing/2010/main">
+                <a:solidFill>
+                  <a:srgbClr val="FFFFFF"/>
+                </a:solidFill>
+              </a14:hiddenFill>
+            </a:ext>
+          </a:extLst>
         </p:spPr>
       </p:pic>
       <p:pic>
         <p:nvPicPr>
-          <p:cNvPr id="15" name="図 14">
-            <a:extLst>
-              <a:ext uri="{FF2B5EF4-FFF2-40B4-BE49-F238E27FC236}">
-                <a16:creationId xmlns:a16="http://schemas.microsoft.com/office/drawing/2014/main" id="{FC058A14-58E7-43DB-AA64-1B38FDBCDD1E}"/>
-              </a:ext>
-            </a:extLst>
-          </p:cNvPr>
-          <p:cNvPicPr>
-            <a:picLocks noChangeAspect="1"/>
-          </p:cNvPicPr>
-          <p:nvPr/>
-        </p:nvPicPr>
-        <p:blipFill>
-          <a:blip r:embed="rId3"/>
-          <a:stretch>
-            <a:fillRect/>
-          </a:stretch>
-        </p:blipFill>
-        <p:spPr>
-          <a:xfrm>
-            <a:off x="10204674" y="2750945"/>
-            <a:ext cx="539432" cy="539432"/>
-          </a:xfrm>
-          <a:prstGeom prst="rect">
-            <a:avLst/>
-          </a:prstGeom>
-        </p:spPr>
-      </p:pic>
-      <p:pic>
-        <p:nvPicPr>
-          <p:cNvPr id="18" name="図 17">
-            <a:extLst>
-              <a:ext uri="{FF2B5EF4-FFF2-40B4-BE49-F238E27FC236}">
-                <a16:creationId xmlns:a16="http://schemas.microsoft.com/office/drawing/2014/main" id="{BD4EE864-D993-4D82-B406-DB926593F78D}"/>
+          <p:cNvPr id="22" name="圖片 21" descr="一張含有 武器 的圖片&#10;&#10;自動產生的描述">
+            <a:extLst>
+              <a:ext uri="{FF2B5EF4-FFF2-40B4-BE49-F238E27FC236}">
+                <a16:creationId xmlns:a16="http://schemas.microsoft.com/office/drawing/2014/main" id="{DCC8D9C9-C6DB-E12B-A95C-CE81A7769DBB}"/>
               </a:ext>
             </a:extLst>
           </p:cNvPr>
@@ -5488,17 +5651,8 @@
         <p:blipFill>
           <a:blip r:embed="rId4">
             <a:extLst>
-              <a:ext uri="{BEBA8EAE-BF5A-486C-A8C5-ECC9F3942E4B}">
-                <a14:imgProps xmlns:a14="http://schemas.microsoft.com/office/drawing/2010/main">
-                  <a14:imgLayer r:embed="rId5">
-                    <a14:imgEffect>
-                      <a14:backgroundRemoval t="10000" b="90667" l="8062" r="89880">
-                        <a14:foregroundMark x1="11835" y1="55867" x2="8062" y2="54667"/>
-                        <a14:foregroundMark x1="55060" y1="89467" x2="61235" y2="90667"/>
-                      </a14:backgroundRemoval>
-                    </a14:imgEffect>
-                  </a14:imgLayer>
-                </a14:imgProps>
+              <a:ext uri="{28A0092B-C50C-407E-A947-70E740481C1C}">
+                <a14:useLocalDpi xmlns:a14="http://schemas.microsoft.com/office/drawing/2010/main" val="0"/>
               </a:ext>
             </a:extLst>
           </a:blip>
@@ -5508,82 +5662,8 @@
         </p:blipFill>
         <p:spPr>
           <a:xfrm>
-            <a:off x="9513772" y="2820406"/>
-            <a:ext cx="741360" cy="953723"/>
-          </a:xfrm>
-          <a:prstGeom prst="rect">
-            <a:avLst/>
-          </a:prstGeom>
-        </p:spPr>
-      </p:pic>
-      <p:pic>
-        <p:nvPicPr>
-          <p:cNvPr id="9" name="図 8">
-            <a:extLst>
-              <a:ext uri="{FF2B5EF4-FFF2-40B4-BE49-F238E27FC236}">
-                <a16:creationId xmlns:a16="http://schemas.microsoft.com/office/drawing/2014/main" id="{BBFE432D-D7CB-4A4C-82BE-4522E7A13D92}"/>
-              </a:ext>
-            </a:extLst>
-          </p:cNvPr>
-          <p:cNvPicPr>
-            <a:picLocks noChangeAspect="1"/>
-          </p:cNvPicPr>
-          <p:nvPr/>
-        </p:nvPicPr>
-        <p:blipFill>
-          <a:blip r:embed="rId3"/>
-          <a:stretch>
-            <a:fillRect/>
-          </a:stretch>
-        </p:blipFill>
-        <p:spPr>
-          <a:xfrm>
-            <a:off x="9067335" y="2742638"/>
-            <a:ext cx="539432" cy="539432"/>
-          </a:xfrm>
-          <a:prstGeom prst="rect">
-            <a:avLst/>
-          </a:prstGeom>
-        </p:spPr>
-      </p:pic>
-      <p:pic>
-        <p:nvPicPr>
-          <p:cNvPr id="17" name="図 16">
-            <a:extLst>
-              <a:ext uri="{FF2B5EF4-FFF2-40B4-BE49-F238E27FC236}">
-                <a16:creationId xmlns:a16="http://schemas.microsoft.com/office/drawing/2014/main" id="{A7D330E8-9F03-4820-9950-4A7BFF120441}"/>
-              </a:ext>
-            </a:extLst>
-          </p:cNvPr>
-          <p:cNvPicPr>
-            <a:picLocks noChangeAspect="1"/>
-          </p:cNvPicPr>
-          <p:nvPr/>
-        </p:nvPicPr>
-        <p:blipFill>
-          <a:blip r:embed="rId6">
-            <a:extLst>
-              <a:ext uri="{BEBA8EAE-BF5A-486C-A8C5-ECC9F3942E4B}">
-                <a14:imgProps xmlns:a14="http://schemas.microsoft.com/office/drawing/2010/main">
-                  <a14:imgLayer r:embed="rId7">
-                    <a14:imgEffect>
-                      <a14:backgroundRemoval t="7059" b="89804" l="9596" r="89899">
-                        <a14:foregroundMark x1="25758" y1="9412" x2="25758" y2="7059"/>
-                      </a14:backgroundRemoval>
-                    </a14:imgEffect>
-                  </a14:imgLayer>
-                </a14:imgProps>
-              </a:ext>
-            </a:extLst>
-          </a:blip>
-          <a:stretch>
-            <a:fillRect/>
-          </a:stretch>
-        </p:blipFill>
-        <p:spPr>
-          <a:xfrm>
-            <a:off x="8697066" y="2772895"/>
-            <a:ext cx="740538" cy="953723"/>
+            <a:off x="10050012" y="1265269"/>
+            <a:ext cx="1495506" cy="1196405"/>
           </a:xfrm>
           <a:prstGeom prst="rect">
             <a:avLst/>
@@ -5899,21 +5979,6 @@
 </file>
 
 <file path=customXml/item1.xml><?xml version="1.0" encoding="utf-8"?>
-<p:properties xmlns:p="http://schemas.microsoft.com/office/2006/metadata/properties" xmlns:xsi="http://www.w3.org/2001/XMLSchema-instance" xmlns:pc="http://schemas.microsoft.com/office/infopath/2007/PartnerControls">
-  <documentManagement/>
-</p:properties>
-</file>
-
-<file path=customXml/item2.xml><?xml version="1.0" encoding="utf-8"?>
-<?mso-contentType ?>
-<FormTemplates xmlns="http://schemas.microsoft.com/sharepoint/v3/contenttype/forms">
-  <Display>DocumentLibraryForm</Display>
-  <Edit>DocumentLibraryForm</Edit>
-  <New>DocumentLibraryForm</New>
-</FormTemplates>
-</file>
-
-<file path=customXml/item3.xml><?xml version="1.0" encoding="utf-8"?>
 <ct:contentTypeSchema xmlns:ct="http://schemas.microsoft.com/office/2006/metadata/contentType" xmlns:ma="http://schemas.microsoft.com/office/2006/metadata/properties/metaAttributes" ct:_="" ma:_="" ma:contentTypeName="ドキュメント" ma:contentTypeID="0x0101005200FFE8E978064C9C92B64316188B6F" ma:contentTypeVersion="2" ma:contentTypeDescription="新しいドキュメントを作成します。" ma:contentTypeScope="" ma:versionID="be92a61ca24d98659104735580dc163c">
   <xsd:schema xmlns:xsd="http://www.w3.org/2001/XMLSchema" xmlns:xs="http://www.w3.org/2001/XMLSchema" xmlns:p="http://schemas.microsoft.com/office/2006/metadata/properties" xmlns:ns2="a7847f0e-f569-40a8-a9dd-dee63eac6162" targetNamespace="http://schemas.microsoft.com/office/2006/metadata/properties" ma:root="true" ma:fieldsID="2ebf28281347a3da3f141c4b63f38a40" ns2:_="">
     <xsd:import namespace="a7847f0e-f569-40a8-a9dd-dee63eac6162"/>
@@ -6045,31 +6110,22 @@
 </ct:contentTypeSchema>
 </file>
 
-<file path=customXml/itemProps1.xml><?xml version="1.0" encoding="utf-8"?>
-<ds:datastoreItem xmlns:ds="http://schemas.openxmlformats.org/officeDocument/2006/customXml" ds:itemID="{BA80B9A8-4339-4F6E-A814-F4AE18989AF0}">
-  <ds:schemaRefs>
-    <ds:schemaRef ds:uri="http://purl.org/dc/dcmitype/"/>
-    <ds:schemaRef ds:uri="http://schemas.openxmlformats.org/package/2006/metadata/core-properties"/>
-    <ds:schemaRef ds:uri="http://www.w3.org/XML/1998/namespace"/>
-    <ds:schemaRef ds:uri="a7847f0e-f569-40a8-a9dd-dee63eac6162"/>
-    <ds:schemaRef ds:uri="http://purl.org/dc/terms/"/>
-    <ds:schemaRef ds:uri="http://schemas.microsoft.com/office/2006/documentManagement/types"/>
-    <ds:schemaRef ds:uri="http://purl.org/dc/elements/1.1/"/>
-    <ds:schemaRef ds:uri="http://schemas.microsoft.com/office/infopath/2007/PartnerControls"/>
-    <ds:schemaRef ds:uri="http://schemas.microsoft.com/office/2006/metadata/properties"/>
-  </ds:schemaRefs>
-</ds:datastoreItem>
+<file path=customXml/item2.xml><?xml version="1.0" encoding="utf-8"?>
+<?mso-contentType ?>
+<FormTemplates xmlns="http://schemas.microsoft.com/sharepoint/v3/contenttype/forms">
+  <Display>DocumentLibraryForm</Display>
+  <Edit>DocumentLibraryForm</Edit>
+  <New>DocumentLibraryForm</New>
+</FormTemplates>
 </file>
 
-<file path=customXml/itemProps2.xml><?xml version="1.0" encoding="utf-8"?>
-<ds:datastoreItem xmlns:ds="http://schemas.openxmlformats.org/officeDocument/2006/customXml" ds:itemID="{A8BFB943-BFBE-49C1-BCA6-D329C385FB8E}">
-  <ds:schemaRefs>
-    <ds:schemaRef ds:uri="http://schemas.microsoft.com/sharepoint/v3/contenttype/forms"/>
-  </ds:schemaRefs>
-</ds:datastoreItem>
+<file path=customXml/item3.xml><?xml version="1.0" encoding="utf-8"?>
+<p:properties xmlns:p="http://schemas.microsoft.com/office/2006/metadata/properties" xmlns:xsi="http://www.w3.org/2001/XMLSchema-instance" xmlns:pc="http://schemas.microsoft.com/office/infopath/2007/PartnerControls">
+  <documentManagement/>
+</p:properties>
 </file>
 
-<file path=customXml/itemProps3.xml><?xml version="1.0" encoding="utf-8"?>
+<file path=customXml/itemProps1.xml><?xml version="1.0" encoding="utf-8"?>
 <ds:datastoreItem xmlns:ds="http://schemas.openxmlformats.org/officeDocument/2006/customXml" ds:itemID="{3AA52913-4DDA-4523-ABE5-DB91ABEC6DE0}">
   <ds:schemaRefs>
     <ds:schemaRef ds:uri="http://schemas.microsoft.com/office/2006/metadata/contentType"/>
@@ -6085,4 +6141,28 @@
     <ds:schemaRef ds:uri="http://schemas.microsoft.com/internal/obd"/>
   </ds:schemaRefs>
 </ds:datastoreItem>
+</file>
+
+<file path=customXml/itemProps2.xml><?xml version="1.0" encoding="utf-8"?>
+<ds:datastoreItem xmlns:ds="http://schemas.openxmlformats.org/officeDocument/2006/customXml" ds:itemID="{A8BFB943-BFBE-49C1-BCA6-D329C385FB8E}">
+  <ds:schemaRefs>
+    <ds:schemaRef ds:uri="http://schemas.microsoft.com/sharepoint/v3/contenttype/forms"/>
+  </ds:schemaRefs>
+</ds:datastoreItem>
+</file>
+
+<file path=customXml/itemProps3.xml><?xml version="1.0" encoding="utf-8"?>
+<ds:datastoreItem xmlns:ds="http://schemas.openxmlformats.org/officeDocument/2006/customXml" ds:itemID="{BA80B9A8-4339-4F6E-A814-F4AE18989AF0}">
+  <ds:schemaRefs>
+    <ds:schemaRef ds:uri="http://purl.org/dc/dcmitype/"/>
+    <ds:schemaRef ds:uri="http://schemas.openxmlformats.org/package/2006/metadata/core-properties"/>
+    <ds:schemaRef ds:uri="http://www.w3.org/XML/1998/namespace"/>
+    <ds:schemaRef ds:uri="a7847f0e-f569-40a8-a9dd-dee63eac6162"/>
+    <ds:schemaRef ds:uri="http://purl.org/dc/terms/"/>
+    <ds:schemaRef ds:uri="http://schemas.microsoft.com/office/2006/documentManagement/types"/>
+    <ds:schemaRef ds:uri="http://purl.org/dc/elements/1.1/"/>
+    <ds:schemaRef ds:uri="http://schemas.microsoft.com/office/infopath/2007/PartnerControls"/>
+    <ds:schemaRef ds:uri="http://schemas.microsoft.com/office/2006/metadata/properties"/>
+  </ds:schemaRefs>
+</ds:datastoreItem>
 </file>
</xml_diff>